<commit_message>
Revert "Revert "Revert "쿼드트리 예제추가 버전"""
This reverts commit b987c7f1900dde1cd5926cee78cdc1f294f1afff.
</commit_message>
<xml_diff>
--- a/001. 세미나 자료/02. 2차시/2014-07-22김혜민 쿼드트리.pptx
+++ b/001. 세미나 자료/02. 2차시/2014-07-22김혜민 쿼드트리.pptx
@@ -7,11 +7,10 @@
   <p:sldIdLst>
     <p:sldId id="263" r:id="rId2"/>
     <p:sldId id="262" r:id="rId3"/>
-    <p:sldId id="268" r:id="rId4"/>
-    <p:sldId id="264" r:id="rId5"/>
-    <p:sldId id="265" r:id="rId6"/>
-    <p:sldId id="267" r:id="rId7"/>
-    <p:sldId id="266" r:id="rId8"/>
+    <p:sldId id="264" r:id="rId4"/>
+    <p:sldId id="265" r:id="rId5"/>
+    <p:sldId id="267" r:id="rId6"/>
+    <p:sldId id="266" r:id="rId7"/>
   </p:sldIdLst>
   <p:sldSz cx="12192000" cy="6858000"/>
   <p:notesSz cx="6797675" cy="9872663"/>
@@ -249,7 +248,7 @@
           <a:p>
             <a:fld id="{0C670B92-38B1-4231-B416-9662904FF1FD}" type="datetimeFigureOut">
               <a:rPr lang="ko-KR" altLang="en-US" smtClean="0"/>
-              <a:t>2014-07-22</a:t>
+              <a:t>2014-07-21</a:t>
             </a:fld>
             <a:endParaRPr lang="ko-KR" altLang="en-US"/>
           </a:p>
@@ -419,7 +418,7 @@
           <a:p>
             <a:fld id="{0C670B92-38B1-4231-B416-9662904FF1FD}" type="datetimeFigureOut">
               <a:rPr lang="ko-KR" altLang="en-US" smtClean="0"/>
-              <a:t>2014-07-22</a:t>
+              <a:t>2014-07-21</a:t>
             </a:fld>
             <a:endParaRPr lang="ko-KR" altLang="en-US"/>
           </a:p>
@@ -599,7 +598,7 @@
           <a:p>
             <a:fld id="{0C670B92-38B1-4231-B416-9662904FF1FD}" type="datetimeFigureOut">
               <a:rPr lang="ko-KR" altLang="en-US" smtClean="0"/>
-              <a:t>2014-07-22</a:t>
+              <a:t>2014-07-21</a:t>
             </a:fld>
             <a:endParaRPr lang="ko-KR" altLang="en-US"/>
           </a:p>
@@ -769,7 +768,7 @@
           <a:p>
             <a:fld id="{0C670B92-38B1-4231-B416-9662904FF1FD}" type="datetimeFigureOut">
               <a:rPr lang="ko-KR" altLang="en-US" smtClean="0"/>
-              <a:t>2014-07-22</a:t>
+              <a:t>2014-07-21</a:t>
             </a:fld>
             <a:endParaRPr lang="ko-KR" altLang="en-US"/>
           </a:p>
@@ -1015,7 +1014,7 @@
           <a:p>
             <a:fld id="{0C670B92-38B1-4231-B416-9662904FF1FD}" type="datetimeFigureOut">
               <a:rPr lang="ko-KR" altLang="en-US" smtClean="0"/>
-              <a:t>2014-07-22</a:t>
+              <a:t>2014-07-21</a:t>
             </a:fld>
             <a:endParaRPr lang="ko-KR" altLang="en-US"/>
           </a:p>
@@ -1247,7 +1246,7 @@
           <a:p>
             <a:fld id="{0C670B92-38B1-4231-B416-9662904FF1FD}" type="datetimeFigureOut">
               <a:rPr lang="ko-KR" altLang="en-US" smtClean="0"/>
-              <a:t>2014-07-22</a:t>
+              <a:t>2014-07-21</a:t>
             </a:fld>
             <a:endParaRPr lang="ko-KR" altLang="en-US"/>
           </a:p>
@@ -1614,7 +1613,7 @@
           <a:p>
             <a:fld id="{0C670B92-38B1-4231-B416-9662904FF1FD}" type="datetimeFigureOut">
               <a:rPr lang="ko-KR" altLang="en-US" smtClean="0"/>
-              <a:t>2014-07-22</a:t>
+              <a:t>2014-07-21</a:t>
             </a:fld>
             <a:endParaRPr lang="ko-KR" altLang="en-US"/>
           </a:p>
@@ -1732,7 +1731,7 @@
           <a:p>
             <a:fld id="{0C670B92-38B1-4231-B416-9662904FF1FD}" type="datetimeFigureOut">
               <a:rPr lang="ko-KR" altLang="en-US" smtClean="0"/>
-              <a:t>2014-07-22</a:t>
+              <a:t>2014-07-21</a:t>
             </a:fld>
             <a:endParaRPr lang="ko-KR" altLang="en-US"/>
           </a:p>
@@ -1827,7 +1826,7 @@
           <a:p>
             <a:fld id="{0C670B92-38B1-4231-B416-9662904FF1FD}" type="datetimeFigureOut">
               <a:rPr lang="ko-KR" altLang="en-US" smtClean="0"/>
-              <a:t>2014-07-22</a:t>
+              <a:t>2014-07-21</a:t>
             </a:fld>
             <a:endParaRPr lang="ko-KR" altLang="en-US"/>
           </a:p>
@@ -2104,7 +2103,7 @@
           <a:p>
             <a:fld id="{0C670B92-38B1-4231-B416-9662904FF1FD}" type="datetimeFigureOut">
               <a:rPr lang="ko-KR" altLang="en-US" smtClean="0"/>
-              <a:t>2014-07-22</a:t>
+              <a:t>2014-07-21</a:t>
             </a:fld>
             <a:endParaRPr lang="ko-KR" altLang="en-US"/>
           </a:p>
@@ -2357,7 +2356,7 @@
           <a:p>
             <a:fld id="{0C670B92-38B1-4231-B416-9662904FF1FD}" type="datetimeFigureOut">
               <a:rPr lang="ko-KR" altLang="en-US" smtClean="0"/>
-              <a:t>2014-07-22</a:t>
+              <a:t>2014-07-21</a:t>
             </a:fld>
             <a:endParaRPr lang="ko-KR" altLang="en-US"/>
           </a:p>
@@ -2570,7 +2569,7 @@
           <a:p>
             <a:fld id="{0C670B92-38B1-4231-B416-9662904FF1FD}" type="datetimeFigureOut">
               <a:rPr lang="ko-KR" altLang="en-US" smtClean="0"/>
-              <a:t>2014-07-22</a:t>
+              <a:t>2014-07-21</a:t>
             </a:fld>
             <a:endParaRPr lang="ko-KR" altLang="en-US"/>
           </a:p>
@@ -3598,6 +3597,7 @@
               <a:rPr lang="en-US" altLang="ko-KR" sz="1600" dirty="0" smtClean="0"/>
               <a:t>.</a:t>
             </a:r>
+            <a:endParaRPr lang="en-US" altLang="ko-KR" sz="1600" dirty="0" smtClean="0"/>
           </a:p>
           <a:p>
             <a:pPr marL="0" indent="0">
@@ -3635,7 +3635,11 @@
             </a:pPr>
             <a:r>
               <a:rPr lang="en-US" altLang="ko-KR" sz="1600" dirty="0" smtClean="0"/>
-              <a:t>    -</a:t>
+              <a:t> </a:t>
+            </a:r>
+            <a:r>
+              <a:rPr lang="en-US" altLang="ko-KR" sz="1600" dirty="0" smtClean="0"/>
+              <a:t>   -</a:t>
             </a:r>
             <a:r>
               <a:rPr lang="ko-KR" altLang="en-US" sz="1600" dirty="0" smtClean="0"/>
@@ -3831,6 +3835,7 @@
               <a:rPr lang="en-US" altLang="ko-KR" sz="1600" dirty="0" smtClean="0"/>
               <a:t>.</a:t>
             </a:r>
+            <a:endParaRPr lang="en-US" altLang="ko-KR" sz="1600" dirty="0" smtClean="0"/>
           </a:p>
           <a:p>
             <a:endParaRPr lang="ko-KR" altLang="en-US" dirty="0"/>
@@ -3912,9 +3917,101 @@
           <a:chExt cx="0" cy="0"/>
         </a:xfrm>
       </p:grpSpPr>
+      <p:sp>
+        <p:nvSpPr>
+          <p:cNvPr id="4" name="직사각형 3"/>
+          <p:cNvSpPr/>
+          <p:nvPr/>
+        </p:nvSpPr>
+        <p:spPr>
+          <a:xfrm>
+            <a:off x="0" y="0"/>
+            <a:ext cx="12192000" cy="273034"/>
+          </a:xfrm>
+          <a:prstGeom prst="rect">
+            <a:avLst/>
+          </a:prstGeom>
+          <a:solidFill>
+            <a:srgbClr val="A43232"/>
+          </a:solidFill>
+          <a:ln>
+            <a:solidFill>
+              <a:schemeClr val="accent2">
+                <a:lumMod val="75000"/>
+              </a:schemeClr>
+            </a:solidFill>
+          </a:ln>
+        </p:spPr>
+        <p:style>
+          <a:lnRef idx="2">
+            <a:schemeClr val="accent1">
+              <a:shade val="50000"/>
+            </a:schemeClr>
+          </a:lnRef>
+          <a:fillRef idx="1">
+            <a:schemeClr val="accent1"/>
+          </a:fillRef>
+          <a:effectRef idx="0">
+            <a:schemeClr val="accent1"/>
+          </a:effectRef>
+          <a:fontRef idx="minor">
+            <a:schemeClr val="lt1"/>
+          </a:fontRef>
+        </p:style>
+        <p:txBody>
+          <a:bodyPr rtlCol="0" anchor="ctr"/>
+          <a:lstStyle/>
+          <a:p>
+            <a:pPr algn="ctr"/>
+            <a:endParaRPr lang="ko-KR" altLang="en-US" dirty="0"/>
+          </a:p>
+        </p:txBody>
+      </p:sp>
+      <p:sp>
+        <p:nvSpPr>
+          <p:cNvPr id="2" name="TextBox 1"/>
+          <p:cNvSpPr txBox="1"/>
+          <p:nvPr/>
+        </p:nvSpPr>
+        <p:spPr>
+          <a:xfrm>
+            <a:off x="9819857" y="-11742"/>
+            <a:ext cx="2335700" cy="307777"/>
+          </a:xfrm>
+          <a:prstGeom prst="rect">
+            <a:avLst/>
+          </a:prstGeom>
+          <a:noFill/>
+        </p:spPr>
+        <p:txBody>
+          <a:bodyPr wrap="square" rtlCol="0">
+            <a:spAutoFit/>
+          </a:bodyPr>
+          <a:lstStyle/>
+          <a:p>
+            <a:r>
+              <a:rPr lang="en-US" altLang="ko-KR" sz="1400" dirty="0" smtClean="0">
+                <a:solidFill>
+                  <a:schemeClr val="accent2"/>
+                </a:solidFill>
+                <a:latin typeface="휴먼모음T" panose="02030504000101010101" pitchFamily="18" charset="-127"/>
+                <a:ea typeface="휴먼모음T" panose="02030504000101010101" pitchFamily="18" charset="-127"/>
+              </a:rPr>
+              <a:t>http://supercom.korea.ac.kr</a:t>
+            </a:r>
+            <a:endParaRPr lang="ko-KR" altLang="en-US" sz="1400" dirty="0">
+              <a:solidFill>
+                <a:schemeClr val="accent2"/>
+              </a:solidFill>
+              <a:latin typeface="휴먼모음T" panose="02030504000101010101" pitchFamily="18" charset="-127"/>
+              <a:ea typeface="휴먼모음T" panose="02030504000101010101" pitchFamily="18" charset="-127"/>
+            </a:endParaRPr>
+          </a:p>
+        </p:txBody>
+      </p:sp>
       <p:pic>
         <p:nvPicPr>
-          <p:cNvPr id="4" name="그림 3"/>
+          <p:cNvPr id="7" name="그림 6"/>
           <p:cNvPicPr>
             <a:picLocks noChangeAspect="1"/>
           </p:cNvPicPr>
@@ -3928,47 +4025,17 @@
         </p:blipFill>
         <p:spPr>
           <a:xfrm>
-            <a:off x="1033302" y="2065440"/>
-            <a:ext cx="1885950" cy="1905000"/>
+            <a:off x="119269" y="6156911"/>
+            <a:ext cx="2790825" cy="561975"/>
           </a:xfrm>
           <a:prstGeom prst="rect">
             <a:avLst/>
           </a:prstGeom>
         </p:spPr>
       </p:pic>
-      <p:sp>
-        <p:nvSpPr>
-          <p:cNvPr id="5" name="TextBox 4"/>
-          <p:cNvSpPr txBox="1"/>
-          <p:nvPr/>
-        </p:nvSpPr>
-        <p:spPr>
-          <a:xfrm>
-            <a:off x="1627464" y="3970440"/>
-            <a:ext cx="697627" cy="369332"/>
-          </a:xfrm>
-          <a:prstGeom prst="rect">
-            <a:avLst/>
-          </a:prstGeom>
-          <a:noFill/>
-        </p:spPr>
-        <p:txBody>
-          <a:bodyPr wrap="none" rtlCol="0">
-            <a:spAutoFit/>
-          </a:bodyPr>
-          <a:lstStyle/>
-          <a:p>
-            <a:r>
-              <a:rPr lang="en-US" altLang="ko-KR" dirty="0" smtClean="0"/>
-              <a:t>(a) w</a:t>
-            </a:r>
-            <a:endParaRPr lang="ko-KR" altLang="en-US" dirty="0"/>
-          </a:p>
-        </p:txBody>
-      </p:sp>
       <p:pic>
         <p:nvPicPr>
-          <p:cNvPr id="6" name="그림 5"/>
+          <p:cNvPr id="8" name="그림 7"/>
           <p:cNvPicPr>
             <a:picLocks noChangeAspect="1"/>
           </p:cNvPicPr>
@@ -3982,51 +4049,17 @@
         </p:blipFill>
         <p:spPr>
           <a:xfrm>
-            <a:off x="4652161" y="2046390"/>
-            <a:ext cx="1847850" cy="1924050"/>
+            <a:off x="10210800" y="5790406"/>
+            <a:ext cx="1809750" cy="1047750"/>
           </a:xfrm>
           <a:prstGeom prst="rect">
             <a:avLst/>
           </a:prstGeom>
         </p:spPr>
       </p:pic>
-      <p:sp>
-        <p:nvSpPr>
-          <p:cNvPr id="7" name="TextBox 6"/>
-          <p:cNvSpPr txBox="1"/>
-          <p:nvPr/>
-        </p:nvSpPr>
-        <p:spPr>
-          <a:xfrm>
-            <a:off x="4925908" y="3970440"/>
-            <a:ext cx="1300356" cy="369332"/>
-          </a:xfrm>
-          <a:prstGeom prst="rect">
-            <a:avLst/>
-          </a:prstGeom>
-          <a:noFill/>
-        </p:spPr>
-        <p:txBody>
-          <a:bodyPr wrap="none" rtlCol="0">
-            <a:spAutoFit/>
-          </a:bodyPr>
-          <a:lstStyle/>
-          <a:p>
-            <a:r>
-              <a:rPr lang="en-US" altLang="ko-KR" dirty="0" smtClean="0"/>
-              <a:t>(b) </a:t>
-            </a:r>
-            <a:r>
-              <a:rPr lang="en-US" altLang="ko-KR" dirty="0" err="1" smtClean="0"/>
-              <a:t>xwwwb</a:t>
-            </a:r>
-            <a:endParaRPr lang="ko-KR" altLang="en-US" dirty="0"/>
-          </a:p>
-        </p:txBody>
-      </p:sp>
       <p:pic>
         <p:nvPicPr>
-          <p:cNvPr id="8" name="그림 7"/>
+          <p:cNvPr id="3" name="그림 2"/>
           <p:cNvPicPr>
             <a:picLocks noChangeAspect="1"/>
           </p:cNvPicPr>
@@ -4040,58 +4073,31 @@
         </p:blipFill>
         <p:spPr>
           <a:xfrm>
-            <a:off x="8232921" y="2065440"/>
-            <a:ext cx="1866900" cy="1885950"/>
+            <a:off x="1689100" y="962051"/>
+            <a:ext cx="8813800" cy="4895349"/>
           </a:xfrm>
           <a:prstGeom prst="rect">
             <a:avLst/>
           </a:prstGeom>
         </p:spPr>
       </p:pic>
-      <p:sp>
-        <p:nvSpPr>
-          <p:cNvPr id="9" name="TextBox 8"/>
-          <p:cNvSpPr txBox="1"/>
-          <p:nvPr/>
-        </p:nvSpPr>
-        <p:spPr>
-          <a:xfrm>
-            <a:off x="8222041" y="3970440"/>
-            <a:ext cx="1888659" cy="369332"/>
-          </a:xfrm>
-          <a:prstGeom prst="rect">
-            <a:avLst/>
-          </a:prstGeom>
-          <a:noFill/>
-        </p:spPr>
-        <p:txBody>
-          <a:bodyPr wrap="none" rtlCol="0">
-            <a:spAutoFit/>
-          </a:bodyPr>
-          <a:lstStyle/>
-          <a:p>
-            <a:r>
-              <a:rPr lang="en-US" altLang="ko-KR" dirty="0" smtClean="0"/>
-              <a:t>(c) </a:t>
-            </a:r>
-            <a:r>
-              <a:rPr lang="en-US" altLang="ko-KR" dirty="0" err="1" smtClean="0"/>
-              <a:t>xwwwxbwww</a:t>
-            </a:r>
-            <a:endParaRPr lang="ko-KR" altLang="en-US" dirty="0"/>
-          </a:p>
-        </p:txBody>
-      </p:sp>
     </p:spTree>
     <p:extLst>
       <p:ext uri="{BB962C8B-B14F-4D97-AF65-F5344CB8AC3E}">
-        <p14:creationId xmlns:p14="http://schemas.microsoft.com/office/powerpoint/2010/main" val="4133588694"/>
+        <p14:creationId xmlns:p14="http://schemas.microsoft.com/office/powerpoint/2010/main" val="1292488097"/>
       </p:ext>
     </p:extLst>
   </p:cSld>
   <p:clrMapOvr>
     <a:masterClrMapping/>
   </p:clrMapOvr>
+  <p:timing>
+    <p:tnLst>
+      <p:par>
+        <p:cTn id="1" dur="indefinite" restart="never" nodeType="tmRoot"/>
+      </p:par>
+    </p:tnLst>
+  </p:timing>
 </p:sld>
 </file>
 
@@ -4254,7 +4260,7 @@
       </p:pic>
       <p:pic>
         <p:nvPicPr>
-          <p:cNvPr id="3" name="그림 2"/>
+          <p:cNvPr id="5" name="그림 4"/>
           <p:cNvPicPr>
             <a:picLocks noChangeAspect="1"/>
           </p:cNvPicPr>
@@ -4268,18 +4274,84 @@
         </p:blipFill>
         <p:spPr>
           <a:xfrm>
-            <a:off x="1689100" y="962051"/>
-            <a:ext cx="8813800" cy="4895349"/>
+            <a:off x="412750" y="545567"/>
+            <a:ext cx="5683250" cy="5338811"/>
           </a:xfrm>
           <a:prstGeom prst="rect">
             <a:avLst/>
           </a:prstGeom>
         </p:spPr>
       </p:pic>
+      <p:cxnSp>
+        <p:nvCxnSpPr>
+          <p:cNvPr id="9" name="직선 화살표 연결선 8"/>
+          <p:cNvCxnSpPr/>
+          <p:nvPr/>
+        </p:nvCxnSpPr>
+        <p:spPr>
+          <a:xfrm>
+            <a:off x="2706894" y="2857500"/>
+            <a:ext cx="5344906" cy="0"/>
+          </a:xfrm>
+          <a:prstGeom prst="straightConnector1">
+            <a:avLst/>
+          </a:prstGeom>
+          <a:ln w="12700">
+            <a:solidFill>
+              <a:srgbClr val="FF0000"/>
+            </a:solidFill>
+            <a:tailEnd type="triangle"/>
+          </a:ln>
+        </p:spPr>
+        <p:style>
+          <a:lnRef idx="1">
+            <a:schemeClr val="accent1"/>
+          </a:lnRef>
+          <a:fillRef idx="0">
+            <a:schemeClr val="accent1"/>
+          </a:fillRef>
+          <a:effectRef idx="0">
+            <a:schemeClr val="accent1"/>
+          </a:effectRef>
+          <a:fontRef idx="minor">
+            <a:schemeClr val="tx1"/>
+          </a:fontRef>
+        </p:style>
+      </p:cxnSp>
+      <p:sp>
+        <p:nvSpPr>
+          <p:cNvPr id="10" name="TextBox 9"/>
+          <p:cNvSpPr txBox="1"/>
+          <p:nvPr/>
+        </p:nvSpPr>
+        <p:spPr>
+          <a:xfrm>
+            <a:off x="8051800" y="2672834"/>
+            <a:ext cx="2507418" cy="369332"/>
+          </a:xfrm>
+          <a:prstGeom prst="rect">
+            <a:avLst/>
+          </a:prstGeom>
+          <a:noFill/>
+        </p:spPr>
+        <p:txBody>
+          <a:bodyPr wrap="none" rtlCol="0">
+            <a:spAutoFit/>
+          </a:bodyPr>
+          <a:lstStyle/>
+          <a:p>
+            <a:r>
+              <a:rPr lang="ko-KR" altLang="en-US" dirty="0" smtClean="0"/>
+              <a:t>테스트 케이스 수 입력</a:t>
+            </a:r>
+            <a:endParaRPr lang="en-US" altLang="ko-KR" dirty="0" smtClean="0"/>
+          </a:p>
+        </p:txBody>
+      </p:sp>
     </p:spTree>
     <p:extLst>
       <p:ext uri="{BB962C8B-B14F-4D97-AF65-F5344CB8AC3E}">
-        <p14:creationId xmlns:p14="http://schemas.microsoft.com/office/powerpoint/2010/main" val="1292488097"/>
+        <p14:creationId xmlns:p14="http://schemas.microsoft.com/office/powerpoint/2010/main" val="1360321231"/>
       </p:ext>
     </p:extLst>
   </p:cSld>
@@ -4455,273 +4527,6 @@
       </p:pic>
       <p:pic>
         <p:nvPicPr>
-          <p:cNvPr id="5" name="그림 4"/>
-          <p:cNvPicPr>
-            <a:picLocks noChangeAspect="1"/>
-          </p:cNvPicPr>
-          <p:nvPr/>
-        </p:nvPicPr>
-        <p:blipFill>
-          <a:blip r:embed="rId4"/>
-          <a:stretch>
-            <a:fillRect/>
-          </a:stretch>
-        </p:blipFill>
-        <p:spPr>
-          <a:xfrm>
-            <a:off x="412750" y="545567"/>
-            <a:ext cx="5683250" cy="5338811"/>
-          </a:xfrm>
-          <a:prstGeom prst="rect">
-            <a:avLst/>
-          </a:prstGeom>
-        </p:spPr>
-      </p:pic>
-      <p:cxnSp>
-        <p:nvCxnSpPr>
-          <p:cNvPr id="9" name="직선 화살표 연결선 8"/>
-          <p:cNvCxnSpPr/>
-          <p:nvPr/>
-        </p:nvCxnSpPr>
-        <p:spPr>
-          <a:xfrm>
-            <a:off x="2706894" y="2857500"/>
-            <a:ext cx="5344906" cy="0"/>
-          </a:xfrm>
-          <a:prstGeom prst="straightConnector1">
-            <a:avLst/>
-          </a:prstGeom>
-          <a:ln w="12700">
-            <a:solidFill>
-              <a:srgbClr val="FF0000"/>
-            </a:solidFill>
-            <a:tailEnd type="triangle"/>
-          </a:ln>
-        </p:spPr>
-        <p:style>
-          <a:lnRef idx="1">
-            <a:schemeClr val="accent1"/>
-          </a:lnRef>
-          <a:fillRef idx="0">
-            <a:schemeClr val="accent1"/>
-          </a:fillRef>
-          <a:effectRef idx="0">
-            <a:schemeClr val="accent1"/>
-          </a:effectRef>
-          <a:fontRef idx="minor">
-            <a:schemeClr val="tx1"/>
-          </a:fontRef>
-        </p:style>
-      </p:cxnSp>
-      <p:sp>
-        <p:nvSpPr>
-          <p:cNvPr id="10" name="TextBox 9"/>
-          <p:cNvSpPr txBox="1"/>
-          <p:nvPr/>
-        </p:nvSpPr>
-        <p:spPr>
-          <a:xfrm>
-            <a:off x="8051800" y="2672834"/>
-            <a:ext cx="2507418" cy="369332"/>
-          </a:xfrm>
-          <a:prstGeom prst="rect">
-            <a:avLst/>
-          </a:prstGeom>
-          <a:noFill/>
-        </p:spPr>
-        <p:txBody>
-          <a:bodyPr wrap="none" rtlCol="0">
-            <a:spAutoFit/>
-          </a:bodyPr>
-          <a:lstStyle/>
-          <a:p>
-            <a:r>
-              <a:rPr lang="ko-KR" altLang="en-US" dirty="0" smtClean="0"/>
-              <a:t>테스트 케이스 수 입력</a:t>
-            </a:r>
-            <a:endParaRPr lang="en-US" altLang="ko-KR" dirty="0" smtClean="0"/>
-          </a:p>
-        </p:txBody>
-      </p:sp>
-    </p:spTree>
-    <p:extLst>
-      <p:ext uri="{BB962C8B-B14F-4D97-AF65-F5344CB8AC3E}">
-        <p14:creationId xmlns:p14="http://schemas.microsoft.com/office/powerpoint/2010/main" val="1360321231"/>
-      </p:ext>
-    </p:extLst>
-  </p:cSld>
-  <p:clrMapOvr>
-    <a:masterClrMapping/>
-  </p:clrMapOvr>
-  <p:timing>
-    <p:tnLst>
-      <p:par>
-        <p:cTn id="1" dur="indefinite" restart="never" nodeType="tmRoot"/>
-      </p:par>
-    </p:tnLst>
-  </p:timing>
-</p:sld>
-</file>
-
-<file path=ppt/slides/slide6.xml><?xml version="1.0" encoding="utf-8"?>
-<p:sld xmlns:a="http://schemas.openxmlformats.org/drawingml/2006/main" xmlns:r="http://schemas.openxmlformats.org/officeDocument/2006/relationships" xmlns:p="http://schemas.openxmlformats.org/presentationml/2006/main">
-  <p:cSld>
-    <p:spTree>
-      <p:nvGrpSpPr>
-        <p:cNvPr id="1" name=""/>
-        <p:cNvGrpSpPr/>
-        <p:nvPr/>
-      </p:nvGrpSpPr>
-      <p:grpSpPr>
-        <a:xfrm>
-          <a:off x="0" y="0"/>
-          <a:ext cx="0" cy="0"/>
-          <a:chOff x="0" y="0"/>
-          <a:chExt cx="0" cy="0"/>
-        </a:xfrm>
-      </p:grpSpPr>
-      <p:sp>
-        <p:nvSpPr>
-          <p:cNvPr id="4" name="직사각형 3"/>
-          <p:cNvSpPr/>
-          <p:nvPr/>
-        </p:nvSpPr>
-        <p:spPr>
-          <a:xfrm>
-            <a:off x="0" y="0"/>
-            <a:ext cx="12192000" cy="273034"/>
-          </a:xfrm>
-          <a:prstGeom prst="rect">
-            <a:avLst/>
-          </a:prstGeom>
-          <a:solidFill>
-            <a:srgbClr val="A43232"/>
-          </a:solidFill>
-          <a:ln>
-            <a:solidFill>
-              <a:schemeClr val="accent2">
-                <a:lumMod val="75000"/>
-              </a:schemeClr>
-            </a:solidFill>
-          </a:ln>
-        </p:spPr>
-        <p:style>
-          <a:lnRef idx="2">
-            <a:schemeClr val="accent1">
-              <a:shade val="50000"/>
-            </a:schemeClr>
-          </a:lnRef>
-          <a:fillRef idx="1">
-            <a:schemeClr val="accent1"/>
-          </a:fillRef>
-          <a:effectRef idx="0">
-            <a:schemeClr val="accent1"/>
-          </a:effectRef>
-          <a:fontRef idx="minor">
-            <a:schemeClr val="lt1"/>
-          </a:fontRef>
-        </p:style>
-        <p:txBody>
-          <a:bodyPr rtlCol="0" anchor="ctr"/>
-          <a:lstStyle/>
-          <a:p>
-            <a:pPr algn="ctr"/>
-            <a:endParaRPr lang="ko-KR" altLang="en-US" dirty="0"/>
-          </a:p>
-        </p:txBody>
-      </p:sp>
-      <p:sp>
-        <p:nvSpPr>
-          <p:cNvPr id="2" name="TextBox 1"/>
-          <p:cNvSpPr txBox="1"/>
-          <p:nvPr/>
-        </p:nvSpPr>
-        <p:spPr>
-          <a:xfrm>
-            <a:off x="9819857" y="-11742"/>
-            <a:ext cx="2335700" cy="307777"/>
-          </a:xfrm>
-          <a:prstGeom prst="rect">
-            <a:avLst/>
-          </a:prstGeom>
-          <a:noFill/>
-        </p:spPr>
-        <p:txBody>
-          <a:bodyPr wrap="square" rtlCol="0">
-            <a:spAutoFit/>
-          </a:bodyPr>
-          <a:lstStyle/>
-          <a:p>
-            <a:r>
-              <a:rPr lang="en-US" altLang="ko-KR" sz="1400" dirty="0" smtClean="0">
-                <a:solidFill>
-                  <a:schemeClr val="accent2"/>
-                </a:solidFill>
-                <a:latin typeface="휴먼모음T" panose="02030504000101010101" pitchFamily="18" charset="-127"/>
-                <a:ea typeface="휴먼모음T" panose="02030504000101010101" pitchFamily="18" charset="-127"/>
-              </a:rPr>
-              <a:t>http://supercom.korea.ac.kr</a:t>
-            </a:r>
-            <a:endParaRPr lang="ko-KR" altLang="en-US" sz="1400" dirty="0">
-              <a:solidFill>
-                <a:schemeClr val="accent2"/>
-              </a:solidFill>
-              <a:latin typeface="휴먼모음T" panose="02030504000101010101" pitchFamily="18" charset="-127"/>
-              <a:ea typeface="휴먼모음T" panose="02030504000101010101" pitchFamily="18" charset="-127"/>
-            </a:endParaRPr>
-          </a:p>
-        </p:txBody>
-      </p:sp>
-      <p:pic>
-        <p:nvPicPr>
-          <p:cNvPr id="7" name="그림 6"/>
-          <p:cNvPicPr>
-            <a:picLocks noChangeAspect="1"/>
-          </p:cNvPicPr>
-          <p:nvPr/>
-        </p:nvPicPr>
-        <p:blipFill>
-          <a:blip r:embed="rId2"/>
-          <a:stretch>
-            <a:fillRect/>
-          </a:stretch>
-        </p:blipFill>
-        <p:spPr>
-          <a:xfrm>
-            <a:off x="119269" y="6156911"/>
-            <a:ext cx="2790825" cy="561975"/>
-          </a:xfrm>
-          <a:prstGeom prst="rect">
-            <a:avLst/>
-          </a:prstGeom>
-        </p:spPr>
-      </p:pic>
-      <p:pic>
-        <p:nvPicPr>
-          <p:cNvPr id="8" name="그림 7"/>
-          <p:cNvPicPr>
-            <a:picLocks noChangeAspect="1"/>
-          </p:cNvPicPr>
-          <p:nvPr/>
-        </p:nvPicPr>
-        <p:blipFill>
-          <a:blip r:embed="rId3"/>
-          <a:stretch>
-            <a:fillRect/>
-          </a:stretch>
-        </p:blipFill>
-        <p:spPr>
-          <a:xfrm>
-            <a:off x="10210800" y="5790406"/>
-            <a:ext cx="1809750" cy="1047750"/>
-          </a:xfrm>
-          <a:prstGeom prst="rect">
-            <a:avLst/>
-          </a:prstGeom>
-        </p:spPr>
-      </p:pic>
-      <p:pic>
-        <p:nvPicPr>
           <p:cNvPr id="3" name="그림 2"/>
           <p:cNvPicPr>
             <a:picLocks noChangeAspect="1"/>
@@ -4982,7 +4787,7 @@
 </p:sld>
 </file>
 
-<file path=ppt/slides/slide7.xml><?xml version="1.0" encoding="utf-8"?>
+<file path=ppt/slides/slide6.xml><?xml version="1.0" encoding="utf-8"?>
 <p:sld xmlns:a="http://schemas.openxmlformats.org/drawingml/2006/main" xmlns:r="http://schemas.openxmlformats.org/officeDocument/2006/relationships" xmlns:p="http://schemas.openxmlformats.org/presentationml/2006/main">
   <p:cSld>
     <p:spTree>

</xml_diff>